<commit_message>
Presentation pricing and alternatives added
</commit_message>
<xml_diff>
--- a/resources/Microsoft Bot Framework.pptx
+++ b/resources/Microsoft Bot Framework.pptx
@@ -27,7 +27,9 @@
     <p:sldId id="277" r:id="rId24"/>
     <p:sldId id="280" r:id="rId25"/>
     <p:sldId id="281" r:id="rId26"/>
-    <p:sldId id="284" r:id="rId27"/>
+    <p:sldId id="285" r:id="rId27"/>
+    <p:sldId id="286" r:id="rId28"/>
+    <p:sldId id="284" r:id="rId29"/>
   </p:sldIdLst>
   <p:sldSz cx="12192000" cy="6858000"/>
   <p:notesSz cx="6858000" cy="9144000"/>
@@ -137,7 +139,7 @@
 <file path=ppt/revisionInfo.xml><?xml version="1.0" encoding="utf-8"?>
 <p1510:revInfo xmlns:a="http://schemas.openxmlformats.org/drawingml/2006/main" xmlns:r="http://schemas.openxmlformats.org/officeDocument/2006/relationships" xmlns:p1510="http://schemas.microsoft.com/office/powerpoint/2015/10/main">
   <p1510:revLst>
-    <p1510:client id="{9B4B6AD5-09F4-43F7-B1FA-C3F12E5AB7AB}" v="7927" dt="2019-04-12T11:42:12.934"/>
+    <p1510:client id="{9B4B6AD5-09F4-43F7-B1FA-C3F12E5AB7AB}" v="9248" dt="2019-04-12T13:21:46.891"/>
   </p1510:revLst>
 </p1510:revInfo>
 </file>
@@ -11685,6 +11687,1139 @@
 <file path=ppt/slides/slide23.xml><?xml version="1.0" encoding="utf-8"?>
 <p:sld xmlns:a="http://schemas.openxmlformats.org/drawingml/2006/main" xmlns:r="http://schemas.openxmlformats.org/officeDocument/2006/relationships" xmlns:p="http://schemas.openxmlformats.org/presentationml/2006/main">
   <p:cSld>
+    <p:spTree>
+      <p:nvGrpSpPr>
+        <p:cNvPr id="1" name=""/>
+        <p:cNvGrpSpPr/>
+        <p:nvPr/>
+      </p:nvGrpSpPr>
+      <p:grpSpPr>
+        <a:xfrm>
+          <a:off x="0" y="0"/>
+          <a:ext cx="0" cy="0"/>
+          <a:chOff x="0" y="0"/>
+          <a:chExt cx="0" cy="0"/>
+        </a:xfrm>
+      </p:grpSpPr>
+      <p:sp>
+        <p:nvSpPr>
+          <p:cNvPr id="2" name="Title 1">
+            <a:extLst>
+              <a:ext uri="{FF2B5EF4-FFF2-40B4-BE49-F238E27FC236}">
+                <a16:creationId xmlns:a16="http://schemas.microsoft.com/office/drawing/2014/main" id="{331842F8-A5F9-4F08-BACC-BC19B6DAF8F4}"/>
+              </a:ext>
+            </a:extLst>
+          </p:cNvPr>
+          <p:cNvSpPr>
+            <a:spLocks noGrp="1"/>
+          </p:cNvSpPr>
+          <p:nvPr>
+            <p:ph type="title"/>
+          </p:nvPr>
+        </p:nvSpPr>
+        <p:spPr/>
+        <p:txBody>
+          <a:bodyPr/>
+          <a:lstStyle/>
+          <a:p>
+            <a:r>
+              <a:rPr lang="en-US" dirty="0"/>
+              <a:t>Microsoft Bot Framework Pricing</a:t>
+            </a:r>
+          </a:p>
+        </p:txBody>
+      </p:sp>
+      <p:graphicFrame>
+        <p:nvGraphicFramePr>
+          <p:cNvPr id="4" name="Content Placeholder 3">
+            <a:extLst>
+              <a:ext uri="{FF2B5EF4-FFF2-40B4-BE49-F238E27FC236}">
+                <a16:creationId xmlns:a16="http://schemas.microsoft.com/office/drawing/2014/main" id="{34541A41-FB9F-456B-B8AA-E951E1380A0C}"/>
+              </a:ext>
+            </a:extLst>
+          </p:cNvPr>
+          <p:cNvGraphicFramePr>
+            <a:graphicFrameLocks noGrp="1"/>
+          </p:cNvGraphicFramePr>
+          <p:nvPr>
+            <p:ph idx="1"/>
+            <p:extLst>
+              <p:ext uri="{D42A27DB-BD31-4B8C-83A1-F6EECF244321}">
+                <p14:modId xmlns:p14="http://schemas.microsoft.com/office/powerpoint/2010/main" val="1816757217"/>
+              </p:ext>
+            </p:extLst>
+          </p:nvPr>
+        </p:nvGraphicFramePr>
+        <p:xfrm>
+          <a:off x="581025" y="2181225"/>
+          <a:ext cx="11029616" cy="1010920"/>
+        </p:xfrm>
+        <a:graphic>
+          <a:graphicData uri="http://schemas.openxmlformats.org/drawingml/2006/table">
+            <a:tbl>
+              <a:tblPr firstRow="1" bandRow="1">
+                <a:tableStyleId>{5C22544A-7EE6-4342-B048-85BDC9FD1C3A}</a:tableStyleId>
+              </a:tblPr>
+              <a:tblGrid>
+                <a:gridCol w="2757404">
+                  <a:extLst>
+                    <a:ext uri="{9D8B030D-6E8A-4147-A177-3AD203B41FA5}">
+                      <a16:colId xmlns:a16="http://schemas.microsoft.com/office/drawing/2014/main" val="958297147"/>
+                    </a:ext>
+                  </a:extLst>
+                </a:gridCol>
+                <a:gridCol w="2757404">
+                  <a:extLst>
+                    <a:ext uri="{9D8B030D-6E8A-4147-A177-3AD203B41FA5}">
+                      <a16:colId xmlns:a16="http://schemas.microsoft.com/office/drawing/2014/main" val="2690647623"/>
+                    </a:ext>
+                  </a:extLst>
+                </a:gridCol>
+                <a:gridCol w="2757404">
+                  <a:extLst>
+                    <a:ext uri="{9D8B030D-6E8A-4147-A177-3AD203B41FA5}">
+                      <a16:colId xmlns:a16="http://schemas.microsoft.com/office/drawing/2014/main" val="4125662563"/>
+                    </a:ext>
+                  </a:extLst>
+                </a:gridCol>
+                <a:gridCol w="2757404">
+                  <a:extLst>
+                    <a:ext uri="{9D8B030D-6E8A-4147-A177-3AD203B41FA5}">
+                      <a16:colId xmlns:a16="http://schemas.microsoft.com/office/drawing/2014/main" val="25135899"/>
+                    </a:ext>
+                  </a:extLst>
+                </a:gridCol>
+              </a:tblGrid>
+              <a:tr h="370840">
+                <a:tc>
+                  <a:txBody>
+                    <a:bodyPr/>
+                    <a:lstStyle/>
+                    <a:p>
+                      <a:r>
+                        <a:rPr lang="en-US" dirty="0"/>
+                        <a:t>Azure Web Bot</a:t>
+                      </a:r>
+                    </a:p>
+                  </a:txBody>
+                  <a:tcPr/>
+                </a:tc>
+                <a:tc>
+                  <a:txBody>
+                    <a:bodyPr/>
+                    <a:lstStyle/>
+                    <a:p>
+                      <a:r>
+                        <a:rPr lang="en-US" dirty="0"/>
+                        <a:t>LUIS</a:t>
+                      </a:r>
+                    </a:p>
+                  </a:txBody>
+                  <a:tcPr/>
+                </a:tc>
+                <a:tc>
+                  <a:txBody>
+                    <a:bodyPr/>
+                    <a:lstStyle/>
+                    <a:p>
+                      <a:r>
+                        <a:rPr lang="en-US" dirty="0"/>
+                        <a:t>Cosmos DB</a:t>
+                      </a:r>
+                    </a:p>
+                  </a:txBody>
+                  <a:tcPr/>
+                </a:tc>
+                <a:tc>
+                  <a:txBody>
+                    <a:bodyPr/>
+                    <a:lstStyle/>
+                    <a:p>
+                      <a:r>
+                        <a:rPr lang="en-US" dirty="0"/>
+                        <a:t>MS Translator API</a:t>
+                      </a:r>
+                    </a:p>
+                  </a:txBody>
+                  <a:tcPr/>
+                </a:tc>
+                <a:extLst>
+                  <a:ext uri="{0D108BD9-81ED-4DB2-BD59-A6C34878D82A}">
+                    <a16:rowId xmlns:a16="http://schemas.microsoft.com/office/drawing/2014/main" val="1420131026"/>
+                  </a:ext>
+                </a:extLst>
+              </a:tr>
+              <a:tr h="370840">
+                <a:tc>
+                  <a:txBody>
+                    <a:bodyPr/>
+                    <a:lstStyle/>
+                    <a:p>
+                      <a:r>
+                        <a:rPr lang="en-US" dirty="0"/>
+                        <a:t>$0.50 per 1000 messages</a:t>
+                      </a:r>
+                    </a:p>
+                  </a:txBody>
+                  <a:tcPr/>
+                </a:tc>
+                <a:tc>
+                  <a:txBody>
+                    <a:bodyPr/>
+                    <a:lstStyle/>
+                    <a:p>
+                      <a:r>
+                        <a:rPr lang="en-US" dirty="0"/>
+                        <a:t>$1.50 per 1000 transactions</a:t>
+                      </a:r>
+                    </a:p>
+                  </a:txBody>
+                  <a:tcPr/>
+                </a:tc>
+                <a:tc>
+                  <a:txBody>
+                    <a:bodyPr/>
+                    <a:lstStyle/>
+                    <a:p>
+                      <a:r>
+                        <a:rPr lang="en-US" dirty="0"/>
+                        <a:t>$6/month for 100 RU/s</a:t>
+                      </a:r>
+                    </a:p>
+                  </a:txBody>
+                  <a:tcPr/>
+                </a:tc>
+                <a:tc>
+                  <a:txBody>
+                    <a:bodyPr/>
+                    <a:lstStyle/>
+                    <a:p>
+                      <a:pPr marL="0" marR="0" lvl="0" indent="0" algn="l" defTabSz="457200" rtl="0" eaLnBrk="1" fontAlgn="auto" latinLnBrk="0" hangingPunct="1">
+                        <a:lnSpc>
+                          <a:spcPct val="100000"/>
+                        </a:lnSpc>
+                        <a:spcBef>
+                          <a:spcPts val="0"/>
+                        </a:spcBef>
+                        <a:spcAft>
+                          <a:spcPts val="0"/>
+                        </a:spcAft>
+                        <a:buClrTx/>
+                        <a:buSzTx/>
+                        <a:buFontTx/>
+                        <a:buNone/>
+                        <a:tabLst/>
+                        <a:defRPr/>
+                      </a:pPr>
+                      <a:r>
+                        <a:rPr lang="en-US" sz="1800" b="0" i="0" kern="1200" dirty="0">
+                          <a:solidFill>
+                            <a:schemeClr val="dk1"/>
+                          </a:solidFill>
+                          <a:effectLst/>
+                          <a:latin typeface="+mn-lt"/>
+                          <a:ea typeface="+mn-ea"/>
+                          <a:cs typeface="+mn-cs"/>
+                        </a:rPr>
+                        <a:t>$10 per million chars of standard translation</a:t>
+                      </a:r>
+                    </a:p>
+                  </a:txBody>
+                  <a:tcPr/>
+                </a:tc>
+                <a:extLst>
+                  <a:ext uri="{0D108BD9-81ED-4DB2-BD59-A6C34878D82A}">
+                    <a16:rowId xmlns:a16="http://schemas.microsoft.com/office/drawing/2014/main" val="3215100767"/>
+                  </a:ext>
+                </a:extLst>
+              </a:tr>
+            </a:tbl>
+          </a:graphicData>
+        </a:graphic>
+      </p:graphicFrame>
+    </p:spTree>
+    <p:extLst>
+      <p:ext uri="{BB962C8B-B14F-4D97-AF65-F5344CB8AC3E}">
+        <p14:creationId xmlns:p14="http://schemas.microsoft.com/office/powerpoint/2010/main" val="2745090840"/>
+      </p:ext>
+    </p:extLst>
+  </p:cSld>
+  <p:clrMapOvr>
+    <a:masterClrMapping/>
+  </p:clrMapOvr>
+</p:sld>
+</file>
+
+<file path=ppt/slides/slide24.xml><?xml version="1.0" encoding="utf-8"?>
+<p:sld xmlns:a="http://schemas.openxmlformats.org/drawingml/2006/main" xmlns:r="http://schemas.openxmlformats.org/officeDocument/2006/relationships" xmlns:p="http://schemas.openxmlformats.org/presentationml/2006/main">
+  <p:cSld>
+    <p:spTree>
+      <p:nvGrpSpPr>
+        <p:cNvPr id="1" name=""/>
+        <p:cNvGrpSpPr/>
+        <p:nvPr/>
+      </p:nvGrpSpPr>
+      <p:grpSpPr>
+        <a:xfrm>
+          <a:off x="0" y="0"/>
+          <a:ext cx="0" cy="0"/>
+          <a:chOff x="0" y="0"/>
+          <a:chExt cx="0" cy="0"/>
+        </a:xfrm>
+      </p:grpSpPr>
+      <p:sp>
+        <p:nvSpPr>
+          <p:cNvPr id="2" name="Title 1">
+            <a:extLst>
+              <a:ext uri="{FF2B5EF4-FFF2-40B4-BE49-F238E27FC236}">
+                <a16:creationId xmlns:a16="http://schemas.microsoft.com/office/drawing/2014/main" id="{97282425-6A7C-4FC7-B301-05D4C19D8939}"/>
+              </a:ext>
+            </a:extLst>
+          </p:cNvPr>
+          <p:cNvSpPr>
+            <a:spLocks noGrp="1"/>
+          </p:cNvSpPr>
+          <p:nvPr>
+            <p:ph type="title"/>
+          </p:nvPr>
+        </p:nvSpPr>
+        <p:spPr/>
+        <p:txBody>
+          <a:bodyPr/>
+          <a:lstStyle/>
+          <a:p>
+            <a:r>
+              <a:rPr lang="en-US" dirty="0"/>
+              <a:t>Microsoft Bot Framework Alternatives</a:t>
+            </a:r>
+          </a:p>
+        </p:txBody>
+      </p:sp>
+      <p:graphicFrame>
+        <p:nvGraphicFramePr>
+          <p:cNvPr id="4" name="Content Placeholder 3">
+            <a:extLst>
+              <a:ext uri="{FF2B5EF4-FFF2-40B4-BE49-F238E27FC236}">
+                <a16:creationId xmlns:a16="http://schemas.microsoft.com/office/drawing/2014/main" id="{8DE71857-FE56-404B-A58A-3E8A255BD0A1}"/>
+              </a:ext>
+            </a:extLst>
+          </p:cNvPr>
+          <p:cNvGraphicFramePr>
+            <a:graphicFrameLocks noGrp="1"/>
+          </p:cNvGraphicFramePr>
+          <p:nvPr>
+            <p:ph idx="1"/>
+            <p:extLst>
+              <p:ext uri="{D42A27DB-BD31-4B8C-83A1-F6EECF244321}">
+                <p14:modId xmlns:p14="http://schemas.microsoft.com/office/powerpoint/2010/main" val="3259354301"/>
+              </p:ext>
+            </p:extLst>
+          </p:nvPr>
+        </p:nvGraphicFramePr>
+        <p:xfrm>
+          <a:off x="580857" y="1895475"/>
+          <a:ext cx="11029614" cy="4604385"/>
+        </p:xfrm>
+        <a:graphic>
+          <a:graphicData uri="http://schemas.openxmlformats.org/drawingml/2006/table">
+            <a:tbl>
+              <a:tblPr firstRow="1" bandRow="1">
+                <a:tableStyleId>{5C22544A-7EE6-4342-B048-85BDC9FD1C3A}</a:tableStyleId>
+              </a:tblPr>
+              <a:tblGrid>
+                <a:gridCol w="1838269">
+                  <a:extLst>
+                    <a:ext uri="{9D8B030D-6E8A-4147-A177-3AD203B41FA5}">
+                      <a16:colId xmlns:a16="http://schemas.microsoft.com/office/drawing/2014/main" val="306571491"/>
+                    </a:ext>
+                  </a:extLst>
+                </a:gridCol>
+                <a:gridCol w="1838269">
+                  <a:extLst>
+                    <a:ext uri="{9D8B030D-6E8A-4147-A177-3AD203B41FA5}">
+                      <a16:colId xmlns:a16="http://schemas.microsoft.com/office/drawing/2014/main" val="1674986560"/>
+                    </a:ext>
+                  </a:extLst>
+                </a:gridCol>
+                <a:gridCol w="1838269">
+                  <a:extLst>
+                    <a:ext uri="{9D8B030D-6E8A-4147-A177-3AD203B41FA5}">
+                      <a16:colId xmlns:a16="http://schemas.microsoft.com/office/drawing/2014/main" val="3090984334"/>
+                    </a:ext>
+                  </a:extLst>
+                </a:gridCol>
+                <a:gridCol w="1838269">
+                  <a:extLst>
+                    <a:ext uri="{9D8B030D-6E8A-4147-A177-3AD203B41FA5}">
+                      <a16:colId xmlns:a16="http://schemas.microsoft.com/office/drawing/2014/main" val="3689838002"/>
+                    </a:ext>
+                  </a:extLst>
+                </a:gridCol>
+                <a:gridCol w="1838269">
+                  <a:extLst>
+                    <a:ext uri="{9D8B030D-6E8A-4147-A177-3AD203B41FA5}">
+                      <a16:colId xmlns:a16="http://schemas.microsoft.com/office/drawing/2014/main" val="3478513418"/>
+                    </a:ext>
+                  </a:extLst>
+                </a:gridCol>
+                <a:gridCol w="1838269">
+                  <a:extLst>
+                    <a:ext uri="{9D8B030D-6E8A-4147-A177-3AD203B41FA5}">
+                      <a16:colId xmlns:a16="http://schemas.microsoft.com/office/drawing/2014/main" val="3572483483"/>
+                    </a:ext>
+                  </a:extLst>
+                </a:gridCol>
+              </a:tblGrid>
+              <a:tr h="266700">
+                <a:tc>
+                  <a:txBody>
+                    <a:bodyPr/>
+                    <a:lstStyle/>
+                    <a:p>
+                      <a:r>
+                        <a:rPr lang="en-US" sz="1200" dirty="0"/>
+                        <a:t>Tool</a:t>
+                      </a:r>
+                    </a:p>
+                  </a:txBody>
+                  <a:tcPr/>
+                </a:tc>
+                <a:tc>
+                  <a:txBody>
+                    <a:bodyPr/>
+                    <a:lstStyle/>
+                    <a:p>
+                      <a:r>
+                        <a:rPr lang="en-US" sz="1200" dirty="0"/>
+                        <a:t>Target Platforms</a:t>
+                      </a:r>
+                    </a:p>
+                  </a:txBody>
+                  <a:tcPr/>
+                </a:tc>
+                <a:tc>
+                  <a:txBody>
+                    <a:bodyPr/>
+                    <a:lstStyle/>
+                    <a:p>
+                      <a:r>
+                        <a:rPr lang="en-US" sz="1200" dirty="0"/>
+                        <a:t>Top examples</a:t>
+                      </a:r>
+                    </a:p>
+                  </a:txBody>
+                  <a:tcPr/>
+                </a:tc>
+                <a:tc>
+                  <a:txBody>
+                    <a:bodyPr/>
+                    <a:lstStyle/>
+                    <a:p>
+                      <a:r>
+                        <a:rPr lang="en-US" sz="1200" dirty="0"/>
+                        <a:t>Bulgarian Support</a:t>
+                      </a:r>
+                    </a:p>
+                  </a:txBody>
+                  <a:tcPr/>
+                </a:tc>
+                <a:tc>
+                  <a:txBody>
+                    <a:bodyPr/>
+                    <a:lstStyle/>
+                    <a:p>
+                      <a:r>
+                        <a:rPr lang="en-US" sz="1200" dirty="0"/>
+                        <a:t>Cool features</a:t>
+                      </a:r>
+                    </a:p>
+                  </a:txBody>
+                  <a:tcPr/>
+                </a:tc>
+                <a:tc>
+                  <a:txBody>
+                    <a:bodyPr/>
+                    <a:lstStyle/>
+                    <a:p>
+                      <a:r>
+                        <a:rPr lang="en-US" sz="1200" dirty="0"/>
+                        <a:t>Pricing</a:t>
+                      </a:r>
+                    </a:p>
+                  </a:txBody>
+                  <a:tcPr/>
+                </a:tc>
+                <a:extLst>
+                  <a:ext uri="{0D108BD9-81ED-4DB2-BD59-A6C34878D82A}">
+                    <a16:rowId xmlns:a16="http://schemas.microsoft.com/office/drawing/2014/main" val="2015415491"/>
+                  </a:ext>
+                </a:extLst>
+              </a:tr>
+              <a:tr h="866775">
+                <a:tc>
+                  <a:txBody>
+                    <a:bodyPr/>
+                    <a:lstStyle/>
+                    <a:p>
+                      <a:r>
+                        <a:rPr lang="en-US" sz="1200" dirty="0"/>
+                        <a:t>MS Bot Framework</a:t>
+                      </a:r>
+                    </a:p>
+                  </a:txBody>
+                  <a:tcPr/>
+                </a:tc>
+                <a:tc>
+                  <a:txBody>
+                    <a:bodyPr/>
+                    <a:lstStyle/>
+                    <a:p>
+                      <a:r>
+                        <a:rPr lang="en-US" sz="1200" b="0" i="0" kern="1200" dirty="0">
+                          <a:solidFill>
+                            <a:schemeClr val="dk1"/>
+                          </a:solidFill>
+                          <a:effectLst/>
+                          <a:latin typeface="+mn-lt"/>
+                          <a:ea typeface="+mn-ea"/>
+                          <a:cs typeface="+mn-cs"/>
+                        </a:rPr>
+                        <a:t>Website, App, Cortana, Microsoft Teams, Skype, Slack, Facebook Messenger</a:t>
+                      </a:r>
+                      <a:endParaRPr lang="en-US" sz="1200" dirty="0"/>
+                    </a:p>
+                  </a:txBody>
+                  <a:tcPr/>
+                </a:tc>
+                <a:tc>
+                  <a:txBody>
+                    <a:bodyPr/>
+                    <a:lstStyle/>
+                    <a:p>
+                      <a:r>
+                        <a:rPr lang="en-US" sz="1200" dirty="0"/>
+                        <a:t>UPS</a:t>
+                      </a:r>
+                    </a:p>
+                  </a:txBody>
+                  <a:tcPr/>
+                </a:tc>
+                <a:tc>
+                  <a:txBody>
+                    <a:bodyPr/>
+                    <a:lstStyle/>
+                    <a:p>
+                      <a:r>
+                        <a:rPr lang="en-US" sz="1200" dirty="0"/>
+                        <a:t>No</a:t>
+                      </a:r>
+                    </a:p>
+                  </a:txBody>
+                  <a:tcPr/>
+                </a:tc>
+                <a:tc>
+                  <a:txBody>
+                    <a:bodyPr/>
+                    <a:lstStyle/>
+                    <a:p>
+                      <a:r>
+                        <a:rPr lang="en-US" sz="1200" dirty="0"/>
+                        <a:t>Can have custom NLP and storage if paid for</a:t>
+                      </a:r>
+                    </a:p>
+                  </a:txBody>
+                  <a:tcPr/>
+                </a:tc>
+                <a:tc>
+                  <a:txBody>
+                    <a:bodyPr/>
+                    <a:lstStyle/>
+                    <a:p>
+                      <a:r>
+                        <a:rPr lang="en-US" sz="1200" dirty="0"/>
+                        <a:t>See previous slide</a:t>
+                      </a:r>
+                    </a:p>
+                  </a:txBody>
+                  <a:tcPr/>
+                </a:tc>
+                <a:extLst>
+                  <a:ext uri="{0D108BD9-81ED-4DB2-BD59-A6C34878D82A}">
+                    <a16:rowId xmlns:a16="http://schemas.microsoft.com/office/drawing/2014/main" val="530300739"/>
+                  </a:ext>
+                </a:extLst>
+              </a:tr>
+              <a:tr h="466725">
+                <a:tc>
+                  <a:txBody>
+                    <a:bodyPr/>
+                    <a:lstStyle/>
+                    <a:p>
+                      <a:r>
+                        <a:rPr lang="en-US" sz="1200" dirty="0"/>
+                        <a:t>IBM Watson</a:t>
+                      </a:r>
+                    </a:p>
+                  </a:txBody>
+                  <a:tcPr/>
+                </a:tc>
+                <a:tc>
+                  <a:txBody>
+                    <a:bodyPr/>
+                    <a:lstStyle/>
+                    <a:p>
+                      <a:r>
+                        <a:rPr lang="en-US" sz="1200" b="0" i="0" kern="1200" dirty="0">
+                          <a:solidFill>
+                            <a:schemeClr val="dk1"/>
+                          </a:solidFill>
+                          <a:effectLst/>
+                          <a:latin typeface="+mn-lt"/>
+                          <a:ea typeface="+mn-ea"/>
+                          <a:cs typeface="+mn-cs"/>
+                        </a:rPr>
+                        <a:t>Facebook Messenger, WhatsApp, Instagram</a:t>
+                      </a:r>
+                      <a:endParaRPr lang="en-US" sz="1200" dirty="0"/>
+                    </a:p>
+                  </a:txBody>
+                  <a:tcPr/>
+                </a:tc>
+                <a:tc>
+                  <a:txBody>
+                    <a:bodyPr/>
+                    <a:lstStyle/>
+                    <a:p>
+                      <a:r>
+                        <a:rPr lang="en-US" sz="1200" b="0" i="0" kern="1200" dirty="0">
+                          <a:solidFill>
+                            <a:schemeClr val="dk1"/>
+                          </a:solidFill>
+                          <a:effectLst/>
+                          <a:latin typeface="+mn-lt"/>
+                          <a:ea typeface="+mn-ea"/>
+                          <a:cs typeface="+mn-cs"/>
+                        </a:rPr>
+                        <a:t>Staples, H&amp;R Block, Autodesk</a:t>
+                      </a:r>
+                      <a:endParaRPr lang="en-US" sz="1200" dirty="0"/>
+                    </a:p>
+                  </a:txBody>
+                  <a:tcPr/>
+                </a:tc>
+                <a:tc>
+                  <a:txBody>
+                    <a:bodyPr/>
+                    <a:lstStyle/>
+                    <a:p>
+                      <a:r>
+                        <a:rPr lang="en-US" sz="1200" dirty="0"/>
+                        <a:t>No</a:t>
+                      </a:r>
+                    </a:p>
+                  </a:txBody>
+                  <a:tcPr/>
+                </a:tc>
+                <a:tc>
+                  <a:txBody>
+                    <a:bodyPr/>
+                    <a:lstStyle/>
+                    <a:p>
+                      <a:r>
+                        <a:rPr lang="en-US" sz="1200" dirty="0"/>
+                        <a:t>Has custom NLP</a:t>
+                      </a:r>
+                    </a:p>
+                  </a:txBody>
+                  <a:tcPr/>
+                </a:tc>
+                <a:tc>
+                  <a:txBody>
+                    <a:bodyPr/>
+                    <a:lstStyle/>
+                    <a:p>
+                      <a:r>
+                        <a:rPr lang="en-US" sz="1200" b="0" i="0" kern="1200" dirty="0">
+                          <a:solidFill>
+                            <a:schemeClr val="dk1"/>
+                          </a:solidFill>
+                          <a:effectLst/>
+                          <a:latin typeface="+mn-lt"/>
+                          <a:ea typeface="+mn-ea"/>
+                          <a:cs typeface="+mn-cs"/>
+                        </a:rPr>
+                        <a:t>$0.0025 per API call</a:t>
+                      </a:r>
+                      <a:endParaRPr lang="en-US" sz="1200" dirty="0"/>
+                    </a:p>
+                  </a:txBody>
+                  <a:tcPr/>
+                </a:tc>
+                <a:extLst>
+                  <a:ext uri="{0D108BD9-81ED-4DB2-BD59-A6C34878D82A}">
+                    <a16:rowId xmlns:a16="http://schemas.microsoft.com/office/drawing/2014/main" val="1860853416"/>
+                  </a:ext>
+                </a:extLst>
+              </a:tr>
+              <a:tr h="782955">
+                <a:tc>
+                  <a:txBody>
+                    <a:bodyPr/>
+                    <a:lstStyle/>
+                    <a:p>
+                      <a:r>
+                        <a:rPr lang="en-US" sz="1200" dirty="0"/>
+                        <a:t>Wit.ai</a:t>
+                      </a:r>
+                    </a:p>
+                  </a:txBody>
+                  <a:tcPr/>
+                </a:tc>
+                <a:tc>
+                  <a:txBody>
+                    <a:bodyPr/>
+                    <a:lstStyle/>
+                    <a:p>
+                      <a:r>
+                        <a:rPr lang="en-US" sz="1200" b="0" i="0" kern="1200" dirty="0">
+                          <a:solidFill>
+                            <a:schemeClr val="dk1"/>
+                          </a:solidFill>
+                          <a:effectLst/>
+                          <a:latin typeface="+mn-lt"/>
+                          <a:ea typeface="+mn-ea"/>
+                          <a:cs typeface="+mn-cs"/>
+                        </a:rPr>
+                        <a:t>Website, App, Cortana, Microsoft Teams, Skype, Slack, Facebook Messenger</a:t>
+                      </a:r>
+                      <a:endParaRPr lang="en-US" sz="1200" dirty="0"/>
+                    </a:p>
+                  </a:txBody>
+                  <a:tcPr/>
+                </a:tc>
+                <a:tc>
+                  <a:txBody>
+                    <a:bodyPr/>
+                    <a:lstStyle/>
+                    <a:p>
+                      <a:r>
+                        <a:rPr lang="en-US" sz="1200" dirty="0"/>
+                        <a:t>UPS</a:t>
+                      </a:r>
+                    </a:p>
+                  </a:txBody>
+                  <a:tcPr/>
+                </a:tc>
+                <a:tc>
+                  <a:txBody>
+                    <a:bodyPr/>
+                    <a:lstStyle/>
+                    <a:p>
+                      <a:r>
+                        <a:rPr lang="en-US" sz="1200" dirty="0"/>
+                        <a:t>Yes</a:t>
+                      </a:r>
+                    </a:p>
+                  </a:txBody>
+                  <a:tcPr/>
+                </a:tc>
+                <a:tc>
+                  <a:txBody>
+                    <a:bodyPr/>
+                    <a:lstStyle/>
+                    <a:p>
+                      <a:r>
+                        <a:rPr lang="en-US" sz="1200" dirty="0"/>
+                        <a:t>Has custom NLP</a:t>
+                      </a:r>
+                    </a:p>
+                  </a:txBody>
+                  <a:tcPr/>
+                </a:tc>
+                <a:tc>
+                  <a:txBody>
+                    <a:bodyPr/>
+                    <a:lstStyle/>
+                    <a:p>
+                      <a:r>
+                        <a:rPr lang="en-US" sz="1200" b="0" i="0" kern="1200" dirty="0">
+                          <a:solidFill>
+                            <a:schemeClr val="dk1"/>
+                          </a:solidFill>
+                          <a:effectLst/>
+                          <a:latin typeface="+mn-lt"/>
+                          <a:ea typeface="+mn-ea"/>
+                          <a:cs typeface="+mn-cs"/>
+                        </a:rPr>
+                        <a:t>$0.50 per 1,000 messages</a:t>
+                      </a:r>
+                      <a:endParaRPr lang="en-US" sz="1200" dirty="0"/>
+                    </a:p>
+                  </a:txBody>
+                  <a:tcPr/>
+                </a:tc>
+                <a:extLst>
+                  <a:ext uri="{0D108BD9-81ED-4DB2-BD59-A6C34878D82A}">
+                    <a16:rowId xmlns:a16="http://schemas.microsoft.com/office/drawing/2014/main" val="809854889"/>
+                  </a:ext>
+                </a:extLst>
+              </a:tr>
+              <a:tr h="866775">
+                <a:tc>
+                  <a:txBody>
+                    <a:bodyPr/>
+                    <a:lstStyle/>
+                    <a:p>
+                      <a:r>
+                        <a:rPr lang="en-US" sz="1200" dirty="0"/>
+                        <a:t>Semantic Machines</a:t>
+                      </a:r>
+                    </a:p>
+                  </a:txBody>
+                  <a:tcPr/>
+                </a:tc>
+                <a:tc>
+                  <a:txBody>
+                    <a:bodyPr/>
+                    <a:lstStyle/>
+                    <a:p>
+                      <a:r>
+                        <a:rPr lang="en-US" sz="1200" b="0" i="0" kern="1200" dirty="0">
+                          <a:solidFill>
+                            <a:schemeClr val="dk1"/>
+                          </a:solidFill>
+                          <a:effectLst/>
+                          <a:latin typeface="+mn-lt"/>
+                          <a:ea typeface="+mn-ea"/>
+                          <a:cs typeface="+mn-cs"/>
+                        </a:rPr>
+                        <a:t>Website, App, Cortana, Microsoft Teams, Skype, Slack, Facebook Messenger</a:t>
+                      </a:r>
+                      <a:endParaRPr lang="en-US" sz="1200" dirty="0"/>
+                    </a:p>
+                  </a:txBody>
+                  <a:tcPr/>
+                </a:tc>
+                <a:tc>
+                  <a:txBody>
+                    <a:bodyPr/>
+                    <a:lstStyle/>
+                    <a:p>
+                      <a:r>
+                        <a:rPr lang="en-US" sz="1200" dirty="0"/>
+                        <a:t>UPS</a:t>
+                      </a:r>
+                    </a:p>
+                  </a:txBody>
+                  <a:tcPr/>
+                </a:tc>
+                <a:tc>
+                  <a:txBody>
+                    <a:bodyPr/>
+                    <a:lstStyle/>
+                    <a:p>
+                      <a:r>
+                        <a:rPr lang="en-US" sz="1200" dirty="0"/>
+                        <a:t>Language Independent</a:t>
+                      </a:r>
+                    </a:p>
+                  </a:txBody>
+                  <a:tcPr/>
+                </a:tc>
+                <a:tc>
+                  <a:txBody>
+                    <a:bodyPr/>
+                    <a:lstStyle/>
+                    <a:p>
+                      <a:r>
+                        <a:rPr lang="en-US" sz="1200" dirty="0"/>
+                        <a:t>Has custom NLP</a:t>
+                      </a:r>
+                    </a:p>
+                  </a:txBody>
+                  <a:tcPr/>
+                </a:tc>
+                <a:tc>
+                  <a:txBody>
+                    <a:bodyPr/>
+                    <a:lstStyle/>
+                    <a:p>
+                      <a:r>
+                        <a:rPr lang="en-US" sz="1200" dirty="0"/>
+                        <a:t>N/A</a:t>
+                      </a:r>
+                    </a:p>
+                  </a:txBody>
+                  <a:tcPr/>
+                </a:tc>
+                <a:extLst>
+                  <a:ext uri="{0D108BD9-81ED-4DB2-BD59-A6C34878D82A}">
+                    <a16:rowId xmlns:a16="http://schemas.microsoft.com/office/drawing/2014/main" val="983780047"/>
+                  </a:ext>
+                </a:extLst>
+              </a:tr>
+              <a:tr h="666750">
+                <a:tc>
+                  <a:txBody>
+                    <a:bodyPr/>
+                    <a:lstStyle/>
+                    <a:p>
+                      <a:pPr marL="0" marR="0" lvl="0" indent="0" algn="l" defTabSz="457200" rtl="0" eaLnBrk="1" fontAlgn="auto" latinLnBrk="0" hangingPunct="1">
+                        <a:lnSpc>
+                          <a:spcPct val="100000"/>
+                        </a:lnSpc>
+                        <a:spcBef>
+                          <a:spcPts val="0"/>
+                        </a:spcBef>
+                        <a:spcAft>
+                          <a:spcPts val="0"/>
+                        </a:spcAft>
+                        <a:buClrTx/>
+                        <a:buSzTx/>
+                        <a:buFontTx/>
+                        <a:buNone/>
+                        <a:tabLst/>
+                        <a:defRPr/>
+                      </a:pPr>
+                      <a:r>
+                        <a:rPr lang="en-US" sz="1200" b="0" i="0" kern="1200" dirty="0">
+                          <a:solidFill>
+                            <a:schemeClr val="dk1"/>
+                          </a:solidFill>
+                          <a:effectLst/>
+                          <a:latin typeface="+mn-lt"/>
+                          <a:ea typeface="+mn-ea"/>
+                          <a:cs typeface="+mn-cs"/>
+                        </a:rPr>
+                        <a:t>Reply.ai</a:t>
+                      </a:r>
+                    </a:p>
+                    <a:p>
+                      <a:endParaRPr lang="en-US" sz="1200" dirty="0"/>
+                    </a:p>
+                  </a:txBody>
+                  <a:tcPr/>
+                </a:tc>
+                <a:tc>
+                  <a:txBody>
+                    <a:bodyPr/>
+                    <a:lstStyle/>
+                    <a:p>
+                      <a:r>
+                        <a:rPr lang="en-US" sz="1200" b="0" i="0" kern="1200" dirty="0">
+                          <a:solidFill>
+                            <a:schemeClr val="dk1"/>
+                          </a:solidFill>
+                          <a:effectLst/>
+                          <a:latin typeface="+mn-lt"/>
+                          <a:ea typeface="+mn-ea"/>
+                          <a:cs typeface="+mn-cs"/>
+                        </a:rPr>
+                        <a:t>Cortana, Microsoft Teams, Skype, Slack, Facebook Messenger</a:t>
+                      </a:r>
+                      <a:endParaRPr lang="en-US" sz="1200" dirty="0"/>
+                    </a:p>
+                  </a:txBody>
+                  <a:tcPr/>
+                </a:tc>
+                <a:tc>
+                  <a:txBody>
+                    <a:bodyPr/>
+                    <a:lstStyle/>
+                    <a:p>
+                      <a:r>
+                        <a:rPr lang="en-US" sz="1200" b="0" i="0" kern="1200" dirty="0">
+                          <a:solidFill>
+                            <a:schemeClr val="dk1"/>
+                          </a:solidFill>
+                          <a:effectLst/>
+                          <a:latin typeface="+mn-lt"/>
+                          <a:ea typeface="+mn-ea"/>
+                          <a:cs typeface="+mn-cs"/>
+                        </a:rPr>
+                        <a:t>Samsung, Coca-Cola, KIA, Hilton, Ad Council</a:t>
+                      </a:r>
+                      <a:endParaRPr lang="en-US" sz="1200" dirty="0"/>
+                    </a:p>
+                  </a:txBody>
+                  <a:tcPr/>
+                </a:tc>
+                <a:tc>
+                  <a:txBody>
+                    <a:bodyPr/>
+                    <a:lstStyle/>
+                    <a:p>
+                      <a:r>
+                        <a:rPr lang="en-US" sz="1200" dirty="0"/>
+                        <a:t>No</a:t>
+                      </a:r>
+                    </a:p>
+                  </a:txBody>
+                  <a:tcPr/>
+                </a:tc>
+                <a:tc>
+                  <a:txBody>
+                    <a:bodyPr/>
+                    <a:lstStyle/>
+                    <a:p>
+                      <a:r>
+                        <a:rPr lang="en-US" sz="1200" dirty="0"/>
+                        <a:t>Has custom NLP</a:t>
+                      </a:r>
+                    </a:p>
+                  </a:txBody>
+                  <a:tcPr/>
+                </a:tc>
+                <a:tc>
+                  <a:txBody>
+                    <a:bodyPr/>
+                    <a:lstStyle/>
+                    <a:p>
+                      <a:r>
+                        <a:rPr lang="en-US" sz="1200" dirty="0"/>
+                        <a:t>N/A</a:t>
+                      </a:r>
+                    </a:p>
+                  </a:txBody>
+                  <a:tcPr/>
+                </a:tc>
+                <a:extLst>
+                  <a:ext uri="{0D108BD9-81ED-4DB2-BD59-A6C34878D82A}">
+                    <a16:rowId xmlns:a16="http://schemas.microsoft.com/office/drawing/2014/main" val="2378358597"/>
+                  </a:ext>
+                </a:extLst>
+              </a:tr>
+              <a:tr h="266700">
+                <a:tc>
+                  <a:txBody>
+                    <a:bodyPr/>
+                    <a:lstStyle/>
+                    <a:p>
+                      <a:r>
+                        <a:rPr lang="en-US" sz="1200" dirty="0"/>
+                        <a:t>Telerik </a:t>
+                      </a:r>
+                      <a:r>
+                        <a:rPr lang="en-US" sz="1200" dirty="0" err="1"/>
+                        <a:t>KinveyChat</a:t>
+                      </a:r>
+                      <a:endParaRPr lang="en-US" sz="1200" dirty="0"/>
+                    </a:p>
+                  </a:txBody>
+                  <a:tcPr/>
+                </a:tc>
+                <a:tc>
+                  <a:txBody>
+                    <a:bodyPr/>
+                    <a:lstStyle/>
+                    <a:p>
+                      <a:pPr fontAlgn="t"/>
+                      <a:r>
+                        <a:rPr lang="en-US" sz="1200" b="0" i="0" kern="1200" dirty="0">
+                          <a:solidFill>
+                            <a:schemeClr val="dk1"/>
+                          </a:solidFill>
+                          <a:effectLst/>
+                          <a:latin typeface="+mn-lt"/>
+                          <a:ea typeface="+mn-ea"/>
+                          <a:cs typeface="+mn-cs"/>
+                        </a:rPr>
+                        <a:t>Facebook, Viber,  iOS, Android,  Websites</a:t>
+                      </a:r>
+                    </a:p>
+                    <a:p>
+                      <a:endParaRPr lang="en-US" sz="1200" dirty="0"/>
+                    </a:p>
+                  </a:txBody>
+                  <a:tcPr/>
+                </a:tc>
+                <a:tc>
+                  <a:txBody>
+                    <a:bodyPr/>
+                    <a:lstStyle/>
+                    <a:p>
+                      <a:r>
+                        <a:rPr lang="en-US" sz="1200" dirty="0"/>
+                        <a:t>N/A</a:t>
+                      </a:r>
+                    </a:p>
+                  </a:txBody>
+                  <a:tcPr/>
+                </a:tc>
+                <a:tc>
+                  <a:txBody>
+                    <a:bodyPr/>
+                    <a:lstStyle/>
+                    <a:p>
+                      <a:r>
+                        <a:rPr lang="en-US" sz="1200" dirty="0"/>
+                        <a:t>Yes</a:t>
+                      </a:r>
+                    </a:p>
+                  </a:txBody>
+                  <a:tcPr/>
+                </a:tc>
+                <a:tc>
+                  <a:txBody>
+                    <a:bodyPr/>
+                    <a:lstStyle/>
+                    <a:p>
+                      <a:r>
+                        <a:rPr lang="en-US" sz="1200" dirty="0"/>
+                        <a:t>Has custom NLP and storage</a:t>
+                      </a:r>
+                    </a:p>
+                  </a:txBody>
+                  <a:tcPr/>
+                </a:tc>
+                <a:tc>
+                  <a:txBody>
+                    <a:bodyPr/>
+                    <a:lstStyle/>
+                    <a:p>
+                      <a:r>
+                        <a:rPr lang="en-US" sz="1200" b="0" i="0" kern="1200" dirty="0">
+                          <a:solidFill>
+                            <a:schemeClr val="dk1"/>
+                          </a:solidFill>
+                          <a:effectLst/>
+                          <a:latin typeface="+mn-lt"/>
+                          <a:ea typeface="+mn-ea"/>
+                          <a:cs typeface="+mn-cs"/>
+                        </a:rPr>
+                        <a:t>$4,995/month</a:t>
+                      </a:r>
+                      <a:endParaRPr lang="en-US" sz="1050" dirty="0"/>
+                    </a:p>
+                  </a:txBody>
+                  <a:tcPr/>
+                </a:tc>
+                <a:extLst>
+                  <a:ext uri="{0D108BD9-81ED-4DB2-BD59-A6C34878D82A}">
+                    <a16:rowId xmlns:a16="http://schemas.microsoft.com/office/drawing/2014/main" val="1178380804"/>
+                  </a:ext>
+                </a:extLst>
+              </a:tr>
+            </a:tbl>
+          </a:graphicData>
+        </a:graphic>
+      </p:graphicFrame>
+    </p:spTree>
+    <p:extLst>
+      <p:ext uri="{BB962C8B-B14F-4D97-AF65-F5344CB8AC3E}">
+        <p14:creationId xmlns:p14="http://schemas.microsoft.com/office/powerpoint/2010/main" val="2899045436"/>
+      </p:ext>
+    </p:extLst>
+  </p:cSld>
+  <p:clrMapOvr>
+    <a:masterClrMapping/>
+  </p:clrMapOvr>
+</p:sld>
+</file>
+
+<file path=ppt/slides/slide25.xml><?xml version="1.0" encoding="utf-8"?>
+<p:sld xmlns:a="http://schemas.openxmlformats.org/drawingml/2006/main" xmlns:r="http://schemas.openxmlformats.org/officeDocument/2006/relationships" xmlns:p="http://schemas.openxmlformats.org/presentationml/2006/main">
+  <p:cSld>
     <p:bg>
       <p:bgPr>
         <a:solidFill>
@@ -12195,8 +13330,8 @@
           <a:lstStyle/>
           <a:p>
             <a:r>
-              <a:rPr lang="en-US" sz="3600"/>
-              <a:t>YOU SHOULD BE GOOD TO GO!</a:t>
+              <a:rPr lang="en-US" sz="3600" dirty="0"/>
+              <a:t>You can now go destroy the world!</a:t>
             </a:r>
           </a:p>
         </p:txBody>
@@ -12708,7 +13843,7 @@
           <a:p>
             <a:r>
               <a:rPr lang="en-US" dirty="0"/>
-              <a:t>LUIS – Language Understanding Informational System</a:t>
+              <a:t>LUIS – Language Understanding Intelligent Service</a:t>
             </a:r>
           </a:p>
           <a:p>
@@ -12720,11 +13855,24 @@
           <a:p>
             <a:r>
               <a:rPr lang="en-US" dirty="0"/>
-              <a:t>Visit </a:t>
+              <a:t>It doesn’t work with Bulgarian yet though it is vastly requested – if you want to use it in Bulgarian you should use a translation API like </a:t>
             </a:r>
             <a:r>
               <a:rPr lang="en-US" dirty="0">
                 <a:hlinkClick r:id="rId2"/>
+              </a:rPr>
+              <a:t>Microsoft Translator API</a:t>
+            </a:r>
+            <a:endParaRPr lang="en-US" dirty="0"/>
+          </a:p>
+          <a:p>
+            <a:r>
+              <a:rPr lang="en-US" dirty="0"/>
+              <a:t>Visit </a:t>
+            </a:r>
+            <a:r>
+              <a:rPr lang="en-US" dirty="0">
+                <a:hlinkClick r:id="rId3"/>
               </a:rPr>
               <a:t>https://eu.luis.ai/applications</a:t>
             </a:r>
@@ -14109,6 +15257,14 @@
 </file>
 
 <file path=customXml/item1.xml><?xml version="1.0" encoding="utf-8"?>
+<p:properties xmlns:p="http://schemas.microsoft.com/office/2006/metadata/properties" xmlns:xsi="http://www.w3.org/2001/XMLSchema-instance" xmlns:pc="http://schemas.microsoft.com/office/infopath/2007/PartnerControls">
+  <documentManagement>
+    <MediaServiceKeyPoints xmlns="71af3243-3dd4-4a8d-8c0d-dd76da1f02a5" xsi:nil="true"/>
+  </documentManagement>
+</p:properties>
+</file>
+
+<file path=customXml/item2.xml><?xml version="1.0" encoding="utf-8"?>
 <ct:contentTypeSchema xmlns:ct="http://schemas.microsoft.com/office/2006/metadata/contentType" xmlns:ma="http://schemas.microsoft.com/office/2006/metadata/properties/metaAttributes" ct:_="" ma:_="" ma:contentTypeName="Document" ma:contentTypeID="0x01010079F111ED35F8CC479449609E8A0923A6" ma:contentTypeVersion="11" ma:contentTypeDescription="Create a new document." ma:contentTypeScope="" ma:versionID="1c2eb7a32e66fb6e4260f3771546a5e2">
   <xsd:schema xmlns:xsd="http://www.w3.org/2001/XMLSchema" xmlns:xs="http://www.w3.org/2001/XMLSchema" xmlns:p="http://schemas.microsoft.com/office/2006/metadata/properties" xmlns:ns2="71af3243-3dd4-4a8d-8c0d-dd76da1f02a5" xmlns:ns3="16c05727-aa75-4e4a-9b5f-8a80a1165891" targetNamespace="http://schemas.microsoft.com/office/2006/metadata/properties" ma:root="true" ma:fieldsID="04e1f6479c48b08974ba73b5ca973489" ns2:_="" ns3:_="">
     <xsd:import namespace="71af3243-3dd4-4a8d-8c0d-dd76da1f02a5"/>
@@ -14319,14 +15475,6 @@
 </ct:contentTypeSchema>
 </file>
 
-<file path=customXml/item2.xml><?xml version="1.0" encoding="utf-8"?>
-<p:properties xmlns:p="http://schemas.microsoft.com/office/2006/metadata/properties" xmlns:xsi="http://www.w3.org/2001/XMLSchema-instance" xmlns:pc="http://schemas.microsoft.com/office/infopath/2007/PartnerControls">
-  <documentManagement>
-    <MediaServiceKeyPoints xmlns="71af3243-3dd4-4a8d-8c0d-dd76da1f02a5" xsi:nil="true"/>
-  </documentManagement>
-</p:properties>
-</file>
-
 <file path=customXml/item3.xml><?xml version="1.0" encoding="utf-8"?>
 <?mso-contentType ?>
 <FormTemplates xmlns="http://schemas.microsoft.com/sharepoint/v3/contenttype/forms">
@@ -14337,6 +15485,23 @@
 </file>
 
 <file path=customXml/itemProps1.xml><?xml version="1.0" encoding="utf-8"?>
+<ds:datastoreItem xmlns:ds="http://schemas.openxmlformats.org/officeDocument/2006/customXml" ds:itemID="{CDEF96C5-3DBB-474D-9A68-6602A116B4D3}">
+  <ds:schemaRefs>
+    <ds:schemaRef ds:uri="http://schemas.microsoft.com/office/2006/metadata/properties"/>
+    <ds:schemaRef ds:uri="http://schemas.microsoft.com/office/2006/documentManagement/types"/>
+    <ds:schemaRef ds:uri="http://purl.org/dc/terms/"/>
+    <ds:schemaRef ds:uri="http://schemas.openxmlformats.org/package/2006/metadata/core-properties"/>
+    <ds:schemaRef ds:uri="16c05727-aa75-4e4a-9b5f-8a80a1165891"/>
+    <ds:schemaRef ds:uri="http://purl.org/dc/dcmitype/"/>
+    <ds:schemaRef ds:uri="http://schemas.microsoft.com/office/infopath/2007/PartnerControls"/>
+    <ds:schemaRef ds:uri="http://purl.org/dc/elements/1.1/"/>
+    <ds:schemaRef ds:uri="71af3243-3dd4-4a8d-8c0d-dd76da1f02a5"/>
+    <ds:schemaRef ds:uri="http://www.w3.org/XML/1998/namespace"/>
+  </ds:schemaRefs>
+</ds:datastoreItem>
+</file>
+
+<file path=customXml/itemProps2.xml><?xml version="1.0" encoding="utf-8"?>
 <ds:datastoreItem xmlns:ds="http://schemas.openxmlformats.org/officeDocument/2006/customXml" ds:itemID="{64ABC737-7714-4383-83AA-9E7E16CCB426}">
   <ds:schemaRefs>
     <ds:schemaRef ds:uri="http://schemas.microsoft.com/office/2006/metadata/contentType"/>
@@ -14355,23 +15520,6 @@
 </ds:datastoreItem>
 </file>
 
-<file path=customXml/itemProps2.xml><?xml version="1.0" encoding="utf-8"?>
-<ds:datastoreItem xmlns:ds="http://schemas.openxmlformats.org/officeDocument/2006/customXml" ds:itemID="{CDEF96C5-3DBB-474D-9A68-6602A116B4D3}">
-  <ds:schemaRefs>
-    <ds:schemaRef ds:uri="http://schemas.openxmlformats.org/package/2006/metadata/core-properties"/>
-    <ds:schemaRef ds:uri="16c05727-aa75-4e4a-9b5f-8a80a1165891"/>
-    <ds:schemaRef ds:uri="http://purl.org/dc/dcmitype/"/>
-    <ds:schemaRef ds:uri="http://schemas.microsoft.com/office/2006/documentManagement/types"/>
-    <ds:schemaRef ds:uri="http://purl.org/dc/elements/1.1/"/>
-    <ds:schemaRef ds:uri="http://schemas.microsoft.com/office/2006/metadata/properties"/>
-    <ds:schemaRef ds:uri="http://purl.org/dc/terms/"/>
-    <ds:schemaRef ds:uri="http://schemas.microsoft.com/office/infopath/2007/PartnerControls"/>
-    <ds:schemaRef ds:uri="71af3243-3dd4-4a8d-8c0d-dd76da1f02a5"/>
-    <ds:schemaRef ds:uri="http://www.w3.org/XML/1998/namespace"/>
-  </ds:schemaRefs>
-</ds:datastoreItem>
-</file>
-
 <file path=customXml/itemProps3.xml><?xml version="1.0" encoding="utf-8"?>
 <ds:datastoreItem xmlns:ds="http://schemas.openxmlformats.org/officeDocument/2006/customXml" ds:itemID="{E713E99F-A368-412C-B268-19FC7C8FD479}">
   <ds:schemaRefs>

</xml_diff>